<commit_message>
cleaned some comments etc
</commit_message>
<xml_diff>
--- a/MoMoviesClassPresentation.pptx
+++ b/MoMoviesClassPresentation.pptx
@@ -130,6 +130,7 @@
 <file path=ppt/revisionInfo.xml><?xml version="1.0" encoding="utf-8"?>
 <p1510:revInfo xmlns:a="http://schemas.openxmlformats.org/drawingml/2006/main" xmlns:r="http://schemas.openxmlformats.org/officeDocument/2006/relationships" xmlns:p1510="http://schemas.microsoft.com/office/powerpoint/2015/10/main">
   <p1510:revLst>
+    <p1510:client id="{4FE8CBD7-78BF-4B93-AD3E-27E34B92CF03}" v="2" dt="2024-07-29T21:59:23.690"/>
     <p1510:client id="{BB522EC8-7459-41E9-8DB6-C34E2288C19E}" v="19" dt="2024-07-29T18:04:47.835"/>
   </p1510:revLst>
 </p1510:revInfo>
@@ -138,423 +139,54 @@
 <file path=ppt/changesInfos/changesInfo1.xml><?xml version="1.0" encoding="utf-8"?>
 <pc:chgInfo xmlns:a="http://schemas.openxmlformats.org/drawingml/2006/main" xmlns:r="http://schemas.openxmlformats.org/officeDocument/2006/relationships" xmlns:ac="http://schemas.microsoft.com/office/drawing/2013/main/command" xmlns:pc="http://schemas.microsoft.com/office/powerpoint/2013/main/command">
   <pc:docChgLst>
-    <pc:chgData name="Christopher Turner" userId="108b2705a18cd39f" providerId="LiveId" clId="{D6C44517-C345-4DCA-92BC-26BBAFC02020}"/>
-    <pc:docChg chg="undo custSel addSld delSld modSld sldOrd">
-      <pc:chgData name="Christopher Turner" userId="108b2705a18cd39f" providerId="LiveId" clId="{D6C44517-C345-4DCA-92BC-26BBAFC02020}" dt="2024-07-25T20:26:51.028" v="2019" actId="478"/>
+    <pc:chgData name="Christopher Turner" userId="108b2705a18cd39f" providerId="LiveId" clId="{55AC9312-E998-4403-AFE4-5A3F6F9DB2D4}"/>
+    <pc:docChg chg="custSel modSld">
+      <pc:chgData name="Christopher Turner" userId="108b2705a18cd39f" providerId="LiveId" clId="{55AC9312-E998-4403-AFE4-5A3F6F9DB2D4}" dt="2024-07-26T00:40:23.495" v="253" actId="20577"/>
       <pc:docMkLst>
         <pc:docMk/>
       </pc:docMkLst>
-      <pc:sldChg chg="delSp modSp mod ord modShow">
-        <pc:chgData name="Christopher Turner" userId="108b2705a18cd39f" providerId="LiveId" clId="{D6C44517-C345-4DCA-92BC-26BBAFC02020}" dt="2024-07-25T20:26:51.028" v="2019" actId="478"/>
-        <pc:sldMkLst>
-          <pc:docMk/>
-          <pc:sldMk cId="3748667521" sldId="256"/>
-        </pc:sldMkLst>
-        <pc:spChg chg="mod">
-          <ac:chgData name="Christopher Turner" userId="108b2705a18cd39f" providerId="LiveId" clId="{D6C44517-C345-4DCA-92BC-26BBAFC02020}" dt="2024-07-25T20:26:44.142" v="2016" actId="6549"/>
-          <ac:spMkLst>
-            <pc:docMk/>
-            <pc:sldMk cId="3748667521" sldId="256"/>
-            <ac:spMk id="6" creationId="{33CDDC14-D7C0-4FC6-8360-4E6E50174088}"/>
-          </ac:spMkLst>
-        </pc:spChg>
-        <pc:spChg chg="mod">
-          <ac:chgData name="Christopher Turner" userId="108b2705a18cd39f" providerId="LiveId" clId="{D6C44517-C345-4DCA-92BC-26BBAFC02020}" dt="2024-07-25T19:34:50.859" v="770" actId="20577"/>
-          <ac:spMkLst>
-            <pc:docMk/>
-            <pc:sldMk cId="3748667521" sldId="256"/>
-            <ac:spMk id="21" creationId="{00000000-0000-0000-0000-000000000000}"/>
-          </ac:spMkLst>
-        </pc:spChg>
-        <pc:spChg chg="mod">
-          <ac:chgData name="Christopher Turner" userId="108b2705a18cd39f" providerId="LiveId" clId="{D6C44517-C345-4DCA-92BC-26BBAFC02020}" dt="2024-07-25T19:36:51.998" v="902" actId="20577"/>
-          <ac:spMkLst>
-            <pc:docMk/>
-            <pc:sldMk cId="3748667521" sldId="256"/>
-            <ac:spMk id="22" creationId="{00000000-0000-0000-0000-000000000000}"/>
-          </ac:spMkLst>
-        </pc:spChg>
-        <pc:spChg chg="del mod">
-          <ac:chgData name="Christopher Turner" userId="108b2705a18cd39f" providerId="LiveId" clId="{D6C44517-C345-4DCA-92BC-26BBAFC02020}" dt="2024-07-25T20:26:51.028" v="2019" actId="478"/>
-          <ac:spMkLst>
-            <pc:docMk/>
-            <pc:sldMk cId="3748667521" sldId="256"/>
-            <ac:spMk id="23" creationId="{00000000-0000-0000-0000-000000000000}"/>
-          </ac:spMkLst>
-        </pc:spChg>
-        <pc:grpChg chg="del">
-          <ac:chgData name="Christopher Turner" userId="108b2705a18cd39f" providerId="LiveId" clId="{D6C44517-C345-4DCA-92BC-26BBAFC02020}" dt="2024-07-25T20:26:46.831" v="2017" actId="478"/>
-          <ac:grpSpMkLst>
-            <pc:docMk/>
-            <pc:sldMk cId="3748667521" sldId="256"/>
-            <ac:grpSpMk id="4" creationId="{E07FEDDE-7BE3-4AF0-89AC-8212D722B9B0}"/>
-          </ac:grpSpMkLst>
-        </pc:grpChg>
-      </pc:sldChg>
-      <pc:sldChg chg="del">
-        <pc:chgData name="Christopher Turner" userId="108b2705a18cd39f" providerId="LiveId" clId="{D6C44517-C345-4DCA-92BC-26BBAFC02020}" dt="2024-07-25T19:20:31.092" v="127" actId="2696"/>
-        <pc:sldMkLst>
-          <pc:docMk/>
-          <pc:sldMk cId="1683866232" sldId="257"/>
-        </pc:sldMkLst>
-      </pc:sldChg>
       <pc:sldChg chg="modSp mod">
-        <pc:chgData name="Christopher Turner" userId="108b2705a18cd39f" providerId="LiveId" clId="{D6C44517-C345-4DCA-92BC-26BBAFC02020}" dt="2024-07-25T19:32:29.466" v="666" actId="20577"/>
-        <pc:sldMkLst>
-          <pc:docMk/>
-          <pc:sldMk cId="2385032039" sldId="258"/>
-        </pc:sldMkLst>
-        <pc:spChg chg="mod">
-          <ac:chgData name="Christopher Turner" userId="108b2705a18cd39f" providerId="LiveId" clId="{D6C44517-C345-4DCA-92BC-26BBAFC02020}" dt="2024-07-25T19:32:00.052" v="658" actId="20577"/>
-          <ac:spMkLst>
-            <pc:docMk/>
-            <pc:sldMk cId="2385032039" sldId="258"/>
-            <ac:spMk id="2" creationId="{00000000-0000-0000-0000-000000000000}"/>
-          </ac:spMkLst>
-        </pc:spChg>
-        <pc:spChg chg="mod">
-          <ac:chgData name="Christopher Turner" userId="108b2705a18cd39f" providerId="LiveId" clId="{D6C44517-C345-4DCA-92BC-26BBAFC02020}" dt="2024-07-25T19:32:29.466" v="666" actId="20577"/>
-          <ac:spMkLst>
-            <pc:docMk/>
-            <pc:sldMk cId="2385032039" sldId="258"/>
-            <ac:spMk id="3" creationId="{00000000-0000-0000-0000-000000000000}"/>
-          </ac:spMkLst>
-        </pc:spChg>
-      </pc:sldChg>
-      <pc:sldChg chg="addSp delSp modSp mod">
-        <pc:chgData name="Christopher Turner" userId="108b2705a18cd39f" providerId="LiveId" clId="{D6C44517-C345-4DCA-92BC-26BBAFC02020}" dt="2024-07-25T19:30:10.700" v="607" actId="478"/>
+        <pc:chgData name="Christopher Turner" userId="108b2705a18cd39f" providerId="LiveId" clId="{55AC9312-E998-4403-AFE4-5A3F6F9DB2D4}" dt="2024-07-26T00:40:23.495" v="253" actId="20577"/>
         <pc:sldMkLst>
           <pc:docMk/>
           <pc:sldMk cId="3382765918" sldId="259"/>
         </pc:sldMkLst>
         <pc:spChg chg="mod">
-          <ac:chgData name="Christopher Turner" userId="108b2705a18cd39f" providerId="LiveId" clId="{D6C44517-C345-4DCA-92BC-26BBAFC02020}" dt="2024-07-25T19:22:54.742" v="255" actId="1076"/>
-          <ac:spMkLst>
-            <pc:docMk/>
-            <pc:sldMk cId="3382765918" sldId="259"/>
-            <ac:spMk id="2" creationId="{00000000-0000-0000-0000-000000000000}"/>
-          </ac:spMkLst>
-        </pc:spChg>
-        <pc:spChg chg="mod">
-          <ac:chgData name="Christopher Turner" userId="108b2705a18cd39f" providerId="LiveId" clId="{D6C44517-C345-4DCA-92BC-26BBAFC02020}" dt="2024-07-25T19:30:06.531" v="606" actId="6549"/>
+          <ac:chgData name="Christopher Turner" userId="108b2705a18cd39f" providerId="LiveId" clId="{55AC9312-E998-4403-AFE4-5A3F6F9DB2D4}" dt="2024-07-26T00:40:23.495" v="253" actId="20577"/>
           <ac:spMkLst>
             <pc:docMk/>
             <pc:sldMk cId="3382765918" sldId="259"/>
             <ac:spMk id="3" creationId="{00000000-0000-0000-0000-000000000000}"/>
           </ac:spMkLst>
         </pc:spChg>
-        <pc:spChg chg="add mod">
-          <ac:chgData name="Christopher Turner" userId="108b2705a18cd39f" providerId="LiveId" clId="{D6C44517-C345-4DCA-92BC-26BBAFC02020}" dt="2024-07-25T19:22:48.925" v="254" actId="1076"/>
-          <ac:spMkLst>
-            <pc:docMk/>
-            <pc:sldMk cId="3382765918" sldId="259"/>
-            <ac:spMk id="4" creationId="{6F78C5BD-FA19-F3BC-73FA-75F36732B267}"/>
-          </ac:spMkLst>
-        </pc:spChg>
-        <pc:spChg chg="add del mod">
-          <ac:chgData name="Christopher Turner" userId="108b2705a18cd39f" providerId="LiveId" clId="{D6C44517-C345-4DCA-92BC-26BBAFC02020}" dt="2024-07-25T19:30:10.700" v="607" actId="478"/>
-          <ac:spMkLst>
-            <pc:docMk/>
-            <pc:sldMk cId="3382765918" sldId="259"/>
-            <ac:spMk id="5" creationId="{92132502-712E-B746-93BC-F12428DF7D80}"/>
-          </ac:spMkLst>
-        </pc:spChg>
-        <pc:spChg chg="add">
-          <ac:chgData name="Christopher Turner" userId="108b2705a18cd39f" providerId="LiveId" clId="{D6C44517-C345-4DCA-92BC-26BBAFC02020}" dt="2024-07-25T19:26:07.359" v="312"/>
-          <ac:spMkLst>
-            <pc:docMk/>
-            <pc:sldMk cId="3382765918" sldId="259"/>
-            <ac:spMk id="6" creationId="{543EE461-4F3A-3A48-4EAA-C72D9B50C6A4}"/>
-          </ac:spMkLst>
-        </pc:spChg>
-        <pc:spChg chg="add">
-          <ac:chgData name="Christopher Turner" userId="108b2705a18cd39f" providerId="LiveId" clId="{D6C44517-C345-4DCA-92BC-26BBAFC02020}" dt="2024-07-25T19:26:10.785" v="313"/>
-          <ac:spMkLst>
-            <pc:docMk/>
-            <pc:sldMk cId="3382765918" sldId="259"/>
-            <ac:spMk id="7" creationId="{CF045A5C-8747-DF83-0AEE-CB1F05440876}"/>
-          </ac:spMkLst>
-        </pc:spChg>
       </pc:sldChg>
-      <pc:sldChg chg="del">
-        <pc:chgData name="Christopher Turner" userId="108b2705a18cd39f" providerId="LiveId" clId="{D6C44517-C345-4DCA-92BC-26BBAFC02020}" dt="2024-07-25T19:38:31.734" v="996" actId="2696"/>
-        <pc:sldMkLst>
-          <pc:docMk/>
-          <pc:sldMk cId="2361836093" sldId="260"/>
-        </pc:sldMkLst>
-      </pc:sldChg>
-      <pc:sldChg chg="addSp delSp modSp mod">
-        <pc:chgData name="Christopher Turner" userId="108b2705a18cd39f" providerId="LiveId" clId="{D6C44517-C345-4DCA-92BC-26BBAFC02020}" dt="2024-07-25T20:18:55.664" v="1918" actId="20577"/>
-        <pc:sldMkLst>
-          <pc:docMk/>
-          <pc:sldMk cId="3291260535" sldId="261"/>
-        </pc:sldMkLst>
-        <pc:spChg chg="add del mod">
-          <ac:chgData name="Christopher Turner" userId="108b2705a18cd39f" providerId="LiveId" clId="{D6C44517-C345-4DCA-92BC-26BBAFC02020}" dt="2024-07-25T20:18:55.664" v="1918" actId="20577"/>
-          <ac:spMkLst>
-            <pc:docMk/>
-            <pc:sldMk cId="3291260535" sldId="261"/>
-            <ac:spMk id="3" creationId="{00000000-0000-0000-0000-000000000000}"/>
-          </ac:spMkLst>
-        </pc:spChg>
-        <pc:graphicFrameChg chg="add mod">
-          <ac:chgData name="Christopher Turner" userId="108b2705a18cd39f" providerId="LiveId" clId="{D6C44517-C345-4DCA-92BC-26BBAFC02020}" dt="2024-07-25T19:31:15.383" v="624"/>
-          <ac:graphicFrameMkLst>
-            <pc:docMk/>
-            <pc:sldMk cId="3291260535" sldId="261"/>
-            <ac:graphicFrameMk id="4" creationId="{E767D679-C6CE-0B9B-9DE0-025A33068BC2}"/>
-          </ac:graphicFrameMkLst>
-        </pc:graphicFrameChg>
-      </pc:sldChg>
-      <pc:sldChg chg="modSp add mod">
-        <pc:chgData name="Christopher Turner" userId="108b2705a18cd39f" providerId="LiveId" clId="{D6C44517-C345-4DCA-92BC-26BBAFC02020}" dt="2024-07-25T20:24:49.168" v="1923"/>
-        <pc:sldMkLst>
-          <pc:docMk/>
-          <pc:sldMk cId="2661206592" sldId="262"/>
-        </pc:sldMkLst>
-        <pc:spChg chg="mod">
-          <ac:chgData name="Christopher Turner" userId="108b2705a18cd39f" providerId="LiveId" clId="{D6C44517-C345-4DCA-92BC-26BBAFC02020}" dt="2024-07-25T19:38:16.095" v="994" actId="20577"/>
-          <ac:spMkLst>
-            <pc:docMk/>
-            <pc:sldMk cId="2661206592" sldId="262"/>
-            <ac:spMk id="2" creationId="{00000000-0000-0000-0000-000000000000}"/>
-          </ac:spMkLst>
-        </pc:spChg>
-        <pc:spChg chg="mod">
-          <ac:chgData name="Christopher Turner" userId="108b2705a18cd39f" providerId="LiveId" clId="{D6C44517-C345-4DCA-92BC-26BBAFC02020}" dt="2024-07-25T20:24:49.168" v="1923"/>
-          <ac:spMkLst>
-            <pc:docMk/>
-            <pc:sldMk cId="2661206592" sldId="262"/>
-            <ac:spMk id="3" creationId="{00000000-0000-0000-0000-000000000000}"/>
-          </ac:spMkLst>
-        </pc:spChg>
-        <pc:spChg chg="mod">
-          <ac:chgData name="Christopher Turner" userId="108b2705a18cd39f" providerId="LiveId" clId="{D6C44517-C345-4DCA-92BC-26BBAFC02020}" dt="2024-07-25T19:37:15.524" v="908" actId="20577"/>
-          <ac:spMkLst>
-            <pc:docMk/>
-            <pc:sldMk cId="2661206592" sldId="262"/>
-            <ac:spMk id="4" creationId="{6F78C5BD-FA19-F3BC-73FA-75F36732B267}"/>
-          </ac:spMkLst>
-        </pc:spChg>
-      </pc:sldChg>
-      <pc:sldChg chg="modSp add mod">
-        <pc:chgData name="Christopher Turner" userId="108b2705a18cd39f" providerId="LiveId" clId="{D6C44517-C345-4DCA-92BC-26BBAFC02020}" dt="2024-07-25T20:24:51.962" v="1924"/>
-        <pc:sldMkLst>
-          <pc:docMk/>
-          <pc:sldMk cId="4218281971" sldId="263"/>
-        </pc:sldMkLst>
-        <pc:spChg chg="mod">
-          <ac:chgData name="Christopher Turner" userId="108b2705a18cd39f" providerId="LiveId" clId="{D6C44517-C345-4DCA-92BC-26BBAFC02020}" dt="2024-07-25T19:38:09.714" v="969" actId="20577"/>
-          <ac:spMkLst>
-            <pc:docMk/>
-            <pc:sldMk cId="4218281971" sldId="263"/>
-            <ac:spMk id="2" creationId="{00000000-0000-0000-0000-000000000000}"/>
-          </ac:spMkLst>
-        </pc:spChg>
-        <pc:spChg chg="mod">
-          <ac:chgData name="Christopher Turner" userId="108b2705a18cd39f" providerId="LiveId" clId="{D6C44517-C345-4DCA-92BC-26BBAFC02020}" dt="2024-07-25T20:24:51.962" v="1924"/>
-          <ac:spMkLst>
-            <pc:docMk/>
-            <pc:sldMk cId="4218281971" sldId="263"/>
-            <ac:spMk id="3" creationId="{00000000-0000-0000-0000-000000000000}"/>
-          </ac:spMkLst>
-        </pc:spChg>
-        <pc:spChg chg="mod">
-          <ac:chgData name="Christopher Turner" userId="108b2705a18cd39f" providerId="LiveId" clId="{D6C44517-C345-4DCA-92BC-26BBAFC02020}" dt="2024-07-25T19:37:43.383" v="916" actId="20577"/>
-          <ac:spMkLst>
-            <pc:docMk/>
-            <pc:sldMk cId="4218281971" sldId="263"/>
-            <ac:spMk id="4" creationId="{6F78C5BD-FA19-F3BC-73FA-75F36732B267}"/>
-          </ac:spMkLst>
-        </pc:spChg>
-      </pc:sldChg>
-      <pc:sldChg chg="modSp add mod ord">
-        <pc:chgData name="Christopher Turner" userId="108b2705a18cd39f" providerId="LiveId" clId="{D6C44517-C345-4DCA-92BC-26BBAFC02020}" dt="2024-07-25T20:24:40.356" v="1922" actId="20577"/>
-        <pc:sldMkLst>
-          <pc:docMk/>
-          <pc:sldMk cId="4191233258" sldId="264"/>
-        </pc:sldMkLst>
-        <pc:spChg chg="mod">
-          <ac:chgData name="Christopher Turner" userId="108b2705a18cd39f" providerId="LiveId" clId="{D6C44517-C345-4DCA-92BC-26BBAFC02020}" dt="2024-07-25T19:37:59.660" v="947" actId="6549"/>
-          <ac:spMkLst>
-            <pc:docMk/>
-            <pc:sldMk cId="4191233258" sldId="264"/>
-            <ac:spMk id="2" creationId="{00000000-0000-0000-0000-000000000000}"/>
-          </ac:spMkLst>
-        </pc:spChg>
-        <pc:spChg chg="mod">
-          <ac:chgData name="Christopher Turner" userId="108b2705a18cd39f" providerId="LiveId" clId="{D6C44517-C345-4DCA-92BC-26BBAFC02020}" dt="2024-07-25T20:24:40.356" v="1922" actId="20577"/>
-          <ac:spMkLst>
-            <pc:docMk/>
-            <pc:sldMk cId="4191233258" sldId="264"/>
-            <ac:spMk id="3" creationId="{00000000-0000-0000-0000-000000000000}"/>
-          </ac:spMkLst>
-        </pc:spChg>
-        <pc:spChg chg="mod">
-          <ac:chgData name="Christopher Turner" userId="108b2705a18cd39f" providerId="LiveId" clId="{D6C44517-C345-4DCA-92BC-26BBAFC02020}" dt="2024-07-25T19:37:48.826" v="921" actId="20577"/>
-          <ac:spMkLst>
-            <pc:docMk/>
-            <pc:sldMk cId="4191233258" sldId="264"/>
-            <ac:spMk id="4" creationId="{6F78C5BD-FA19-F3BC-73FA-75F36732B267}"/>
-          </ac:spMkLst>
-        </pc:spChg>
-      </pc:sldChg>
-      <pc:sldChg chg="addSp modSp add mod">
-        <pc:chgData name="Christopher Turner" userId="108b2705a18cd39f" providerId="LiveId" clId="{D6C44517-C345-4DCA-92BC-26BBAFC02020}" dt="2024-07-25T19:46:49.951" v="1488"/>
-        <pc:sldMkLst>
-          <pc:docMk/>
-          <pc:sldMk cId="77602882" sldId="265"/>
-        </pc:sldMkLst>
-        <pc:spChg chg="mod">
-          <ac:chgData name="Christopher Turner" userId="108b2705a18cd39f" providerId="LiveId" clId="{D6C44517-C345-4DCA-92BC-26BBAFC02020}" dt="2024-07-25T19:38:41.875" v="1033" actId="20577"/>
-          <ac:spMkLst>
-            <pc:docMk/>
-            <pc:sldMk cId="77602882" sldId="265"/>
-            <ac:spMk id="2" creationId="{00000000-0000-0000-0000-000000000000}"/>
-          </ac:spMkLst>
-        </pc:spChg>
-        <pc:spChg chg="mod">
-          <ac:chgData name="Christopher Turner" userId="108b2705a18cd39f" providerId="LiveId" clId="{D6C44517-C345-4DCA-92BC-26BBAFC02020}" dt="2024-07-25T19:39:12.300" v="1079" actId="20577"/>
-          <ac:spMkLst>
-            <pc:docMk/>
-            <pc:sldMk cId="77602882" sldId="265"/>
-            <ac:spMk id="3" creationId="{00000000-0000-0000-0000-000000000000}"/>
-          </ac:spMkLst>
-        </pc:spChg>
-        <pc:spChg chg="mod">
-          <ac:chgData name="Christopher Turner" userId="108b2705a18cd39f" providerId="LiveId" clId="{D6C44517-C345-4DCA-92BC-26BBAFC02020}" dt="2024-07-25T19:45:27.579" v="1487" actId="20577"/>
-          <ac:spMkLst>
-            <pc:docMk/>
-            <pc:sldMk cId="77602882" sldId="265"/>
-            <ac:spMk id="4" creationId="{6F78C5BD-FA19-F3BC-73FA-75F36732B267}"/>
-          </ac:spMkLst>
-        </pc:spChg>
-        <pc:spChg chg="add">
-          <ac:chgData name="Christopher Turner" userId="108b2705a18cd39f" providerId="LiveId" clId="{D6C44517-C345-4DCA-92BC-26BBAFC02020}" dt="2024-07-25T19:46:49.951" v="1488"/>
-          <ac:spMkLst>
-            <pc:docMk/>
-            <pc:sldMk cId="77602882" sldId="265"/>
-            <ac:spMk id="5" creationId="{BA5DC2C7-4EC1-91D1-04DB-0268B58EF734}"/>
-          </ac:spMkLst>
-        </pc:spChg>
-      </pc:sldChg>
-      <pc:sldChg chg="add del">
-        <pc:chgData name="Christopher Turner" userId="108b2705a18cd39f" providerId="LiveId" clId="{D6C44517-C345-4DCA-92BC-26BBAFC02020}" dt="2024-07-25T19:39:23.194" v="1081" actId="2890"/>
-        <pc:sldMkLst>
-          <pc:docMk/>
-          <pc:sldMk cId="242601211" sldId="266"/>
-        </pc:sldMkLst>
-      </pc:sldChg>
-      <pc:sldChg chg="modSp new mod ord">
-        <pc:chgData name="Christopher Turner" userId="108b2705a18cd39f" providerId="LiveId" clId="{D6C44517-C345-4DCA-92BC-26BBAFC02020}" dt="2024-07-25T19:43:02.996" v="1373"/>
+      <pc:sldChg chg="addSp mod">
+        <pc:chgData name="Christopher Turner" userId="108b2705a18cd39f" providerId="LiveId" clId="{55AC9312-E998-4403-AFE4-5A3F6F9DB2D4}" dt="2024-07-26T00:27:46.829" v="22" actId="11529"/>
         <pc:sldMkLst>
           <pc:docMk/>
           <pc:sldMk cId="2357912295" sldId="266"/>
         </pc:sldMkLst>
-        <pc:spChg chg="mod">
-          <ac:chgData name="Christopher Turner" userId="108b2705a18cd39f" providerId="LiveId" clId="{D6C44517-C345-4DCA-92BC-26BBAFC02020}" dt="2024-07-25T19:40:53.758" v="1270" actId="20577"/>
+        <pc:spChg chg="add">
+          <ac:chgData name="Christopher Turner" userId="108b2705a18cd39f" providerId="LiveId" clId="{55AC9312-E998-4403-AFE4-5A3F6F9DB2D4}" dt="2024-07-26T00:27:46.829" v="22" actId="11529"/>
           <ac:spMkLst>
             <pc:docMk/>
             <pc:sldMk cId="2357912295" sldId="266"/>
-            <ac:spMk id="2" creationId="{3D7B3BD4-ECBA-DED0-C9B9-A577AF386EB5}"/>
-          </ac:spMkLst>
-        </pc:spChg>
-        <pc:spChg chg="mod">
-          <ac:chgData name="Christopher Turner" userId="108b2705a18cd39f" providerId="LiveId" clId="{D6C44517-C345-4DCA-92BC-26BBAFC02020}" dt="2024-07-25T19:40:47.435" v="1262" actId="20577"/>
-          <ac:spMkLst>
-            <pc:docMk/>
-            <pc:sldMk cId="2357912295" sldId="266"/>
-            <ac:spMk id="3" creationId="{F95E2A37-E369-BD1A-E50B-B049F9C4C2CC}"/>
+            <ac:spMk id="4" creationId="{F1016C3E-913B-FD80-80AD-1BB04C427B36}"/>
           </ac:spMkLst>
         </pc:spChg>
       </pc:sldChg>
-      <pc:sldChg chg="modSp add mod ord">
-        <pc:chgData name="Christopher Turner" userId="108b2705a18cd39f" providerId="LiveId" clId="{D6C44517-C345-4DCA-92BC-26BBAFC02020}" dt="2024-07-25T19:43:12.129" v="1375"/>
-        <pc:sldMkLst>
-          <pc:docMk/>
-          <pc:sldMk cId="695019442" sldId="267"/>
-        </pc:sldMkLst>
-        <pc:spChg chg="mod">
-          <ac:chgData name="Christopher Turner" userId="108b2705a18cd39f" providerId="LiveId" clId="{D6C44517-C345-4DCA-92BC-26BBAFC02020}" dt="2024-07-25T19:40:58.685" v="1272" actId="20577"/>
-          <ac:spMkLst>
-            <pc:docMk/>
-            <pc:sldMk cId="695019442" sldId="267"/>
-            <ac:spMk id="2" creationId="{3D7B3BD4-ECBA-DED0-C9B9-A577AF386EB5}"/>
-          </ac:spMkLst>
-        </pc:spChg>
-      </pc:sldChg>
-      <pc:sldChg chg="modSp add mod ord">
-        <pc:chgData name="Christopher Turner" userId="108b2705a18cd39f" providerId="LiveId" clId="{D6C44517-C345-4DCA-92BC-26BBAFC02020}" dt="2024-07-25T19:43:44.415" v="1391" actId="20577"/>
-        <pc:sldMkLst>
-          <pc:docMk/>
-          <pc:sldMk cId="3298747479" sldId="268"/>
-        </pc:sldMkLst>
-        <pc:spChg chg="mod">
-          <ac:chgData name="Christopher Turner" userId="108b2705a18cd39f" providerId="LiveId" clId="{D6C44517-C345-4DCA-92BC-26BBAFC02020}" dt="2024-07-25T19:43:44.415" v="1391" actId="20577"/>
-          <ac:spMkLst>
-            <pc:docMk/>
-            <pc:sldMk cId="3298747479" sldId="268"/>
-            <ac:spMk id="2" creationId="{3D7B3BD4-ECBA-DED0-C9B9-A577AF386EB5}"/>
-          </ac:spMkLst>
-        </pc:spChg>
-      </pc:sldChg>
-      <pc:sldChg chg="modSp add mod">
-        <pc:chgData name="Christopher Turner" userId="108b2705a18cd39f" providerId="LiveId" clId="{D6C44517-C345-4DCA-92BC-26BBAFC02020}" dt="2024-07-25T19:41:23.615" v="1296" actId="20577"/>
-        <pc:sldMkLst>
-          <pc:docMk/>
-          <pc:sldMk cId="232526807" sldId="269"/>
-        </pc:sldMkLst>
-        <pc:spChg chg="mod">
-          <ac:chgData name="Christopher Turner" userId="108b2705a18cd39f" providerId="LiveId" clId="{D6C44517-C345-4DCA-92BC-26BBAFC02020}" dt="2024-07-25T19:41:23.615" v="1296" actId="20577"/>
-          <ac:spMkLst>
-            <pc:docMk/>
-            <pc:sldMk cId="232526807" sldId="269"/>
-            <ac:spMk id="2" creationId="{3D7B3BD4-ECBA-DED0-C9B9-A577AF386EB5}"/>
-          </ac:spMkLst>
-        </pc:spChg>
-      </pc:sldChg>
-      <pc:sldChg chg="add">
-        <pc:chgData name="Christopher Turner" userId="108b2705a18cd39f" providerId="LiveId" clId="{D6C44517-C345-4DCA-92BC-26BBAFC02020}" dt="2024-07-25T19:43:31.155" v="1376" actId="2890"/>
-        <pc:sldMkLst>
-          <pc:docMk/>
-          <pc:sldMk cId="2249364170" sldId="270"/>
-        </pc:sldMkLst>
-      </pc:sldChg>
-      <pc:sldChg chg="modSp add mod">
-        <pc:chgData name="Christopher Turner" userId="108b2705a18cd39f" providerId="LiveId" clId="{D6C44517-C345-4DCA-92BC-26BBAFC02020}" dt="2024-07-25T19:44:00.134" v="1394" actId="20577"/>
+      <pc:sldChg chg="modSp mod">
+        <pc:chgData name="Christopher Turner" userId="108b2705a18cd39f" providerId="LiveId" clId="{55AC9312-E998-4403-AFE4-5A3F6F9DB2D4}" dt="2024-07-25T23:43:52.927" v="21" actId="20577"/>
         <pc:sldMkLst>
           <pc:docMk/>
           <pc:sldMk cId="1221097782" sldId="271"/>
         </pc:sldMkLst>
         <pc:spChg chg="mod">
-          <ac:chgData name="Christopher Turner" userId="108b2705a18cd39f" providerId="LiveId" clId="{D6C44517-C345-4DCA-92BC-26BBAFC02020}" dt="2024-07-25T19:44:00.134" v="1394" actId="20577"/>
+          <ac:chgData name="Christopher Turner" userId="108b2705a18cd39f" providerId="LiveId" clId="{55AC9312-E998-4403-AFE4-5A3F6F9DB2D4}" dt="2024-07-25T23:43:52.927" v="21" actId="20577"/>
           <ac:spMkLst>
             <pc:docMk/>
             <pc:sldMk cId="1221097782" sldId="271"/>
             <ac:spMk id="2" creationId="{3D7B3BD4-ECBA-DED0-C9B9-A577AF386EB5}"/>
-          </ac:spMkLst>
-        </pc:spChg>
-      </pc:sldChg>
-      <pc:sldChg chg="modSp add mod">
-        <pc:chgData name="Christopher Turner" userId="108b2705a18cd39f" providerId="LiveId" clId="{D6C44517-C345-4DCA-92BC-26BBAFC02020}" dt="2024-07-25T20:25:37.664" v="2012" actId="20577"/>
-        <pc:sldMkLst>
-          <pc:docMk/>
-          <pc:sldMk cId="3624028729" sldId="272"/>
-        </pc:sldMkLst>
-        <pc:spChg chg="mod">
-          <ac:chgData name="Christopher Turner" userId="108b2705a18cd39f" providerId="LiveId" clId="{D6C44517-C345-4DCA-92BC-26BBAFC02020}" dt="2024-07-25T19:49:07.729" v="1717" actId="20577"/>
-          <ac:spMkLst>
-            <pc:docMk/>
-            <pc:sldMk cId="3624028729" sldId="272"/>
-            <ac:spMk id="2" creationId="{00000000-0000-0000-0000-000000000000}"/>
-          </ac:spMkLst>
-        </pc:spChg>
-        <pc:spChg chg="mod">
-          <ac:chgData name="Christopher Turner" userId="108b2705a18cd39f" providerId="LiveId" clId="{D6C44517-C345-4DCA-92BC-26BBAFC02020}" dt="2024-07-25T20:25:37.664" v="2012" actId="20577"/>
-          <ac:spMkLst>
-            <pc:docMk/>
-            <pc:sldMk cId="3624028729" sldId="272"/>
-            <ac:spMk id="3" creationId="{00000000-0000-0000-0000-000000000000}"/>
           </ac:spMkLst>
         </pc:spChg>
       </pc:sldChg>
@@ -1502,56 +1134,489 @@
     </pc:docChg>
   </pc:docChgLst>
   <pc:docChgLst>
-    <pc:chgData name="Christopher Turner" userId="108b2705a18cd39f" providerId="LiveId" clId="{55AC9312-E998-4403-AFE4-5A3F6F9DB2D4}"/>
-    <pc:docChg chg="custSel modSld">
-      <pc:chgData name="Christopher Turner" userId="108b2705a18cd39f" providerId="LiveId" clId="{55AC9312-E998-4403-AFE4-5A3F6F9DB2D4}" dt="2024-07-26T00:40:23.495" v="253" actId="20577"/>
+    <pc:chgData name="Christopher Turner" userId="108b2705a18cd39f" providerId="LiveId" clId="{D6C44517-C345-4DCA-92BC-26BBAFC02020}"/>
+    <pc:docChg chg="undo custSel addSld delSld modSld sldOrd">
+      <pc:chgData name="Christopher Turner" userId="108b2705a18cd39f" providerId="LiveId" clId="{D6C44517-C345-4DCA-92BC-26BBAFC02020}" dt="2024-07-25T20:26:51.028" v="2019" actId="478"/>
       <pc:docMkLst>
         <pc:docMk/>
       </pc:docMkLst>
+      <pc:sldChg chg="delSp modSp mod ord modShow">
+        <pc:chgData name="Christopher Turner" userId="108b2705a18cd39f" providerId="LiveId" clId="{D6C44517-C345-4DCA-92BC-26BBAFC02020}" dt="2024-07-25T20:26:51.028" v="2019" actId="478"/>
+        <pc:sldMkLst>
+          <pc:docMk/>
+          <pc:sldMk cId="3748667521" sldId="256"/>
+        </pc:sldMkLst>
+        <pc:spChg chg="mod">
+          <ac:chgData name="Christopher Turner" userId="108b2705a18cd39f" providerId="LiveId" clId="{D6C44517-C345-4DCA-92BC-26BBAFC02020}" dt="2024-07-25T20:26:44.142" v="2016" actId="6549"/>
+          <ac:spMkLst>
+            <pc:docMk/>
+            <pc:sldMk cId="3748667521" sldId="256"/>
+            <ac:spMk id="6" creationId="{33CDDC14-D7C0-4FC6-8360-4E6E50174088}"/>
+          </ac:spMkLst>
+        </pc:spChg>
+        <pc:spChg chg="mod">
+          <ac:chgData name="Christopher Turner" userId="108b2705a18cd39f" providerId="LiveId" clId="{D6C44517-C345-4DCA-92BC-26BBAFC02020}" dt="2024-07-25T19:34:50.859" v="770" actId="20577"/>
+          <ac:spMkLst>
+            <pc:docMk/>
+            <pc:sldMk cId="3748667521" sldId="256"/>
+            <ac:spMk id="21" creationId="{00000000-0000-0000-0000-000000000000}"/>
+          </ac:spMkLst>
+        </pc:spChg>
+        <pc:spChg chg="mod">
+          <ac:chgData name="Christopher Turner" userId="108b2705a18cd39f" providerId="LiveId" clId="{D6C44517-C345-4DCA-92BC-26BBAFC02020}" dt="2024-07-25T19:36:51.998" v="902" actId="20577"/>
+          <ac:spMkLst>
+            <pc:docMk/>
+            <pc:sldMk cId="3748667521" sldId="256"/>
+            <ac:spMk id="22" creationId="{00000000-0000-0000-0000-000000000000}"/>
+          </ac:spMkLst>
+        </pc:spChg>
+        <pc:spChg chg="del mod">
+          <ac:chgData name="Christopher Turner" userId="108b2705a18cd39f" providerId="LiveId" clId="{D6C44517-C345-4DCA-92BC-26BBAFC02020}" dt="2024-07-25T20:26:51.028" v="2019" actId="478"/>
+          <ac:spMkLst>
+            <pc:docMk/>
+            <pc:sldMk cId="3748667521" sldId="256"/>
+            <ac:spMk id="23" creationId="{00000000-0000-0000-0000-000000000000}"/>
+          </ac:spMkLst>
+        </pc:spChg>
+        <pc:grpChg chg="del">
+          <ac:chgData name="Christopher Turner" userId="108b2705a18cd39f" providerId="LiveId" clId="{D6C44517-C345-4DCA-92BC-26BBAFC02020}" dt="2024-07-25T20:26:46.831" v="2017" actId="478"/>
+          <ac:grpSpMkLst>
+            <pc:docMk/>
+            <pc:sldMk cId="3748667521" sldId="256"/>
+            <ac:grpSpMk id="4" creationId="{E07FEDDE-7BE3-4AF0-89AC-8212D722B9B0}"/>
+          </ac:grpSpMkLst>
+        </pc:grpChg>
+      </pc:sldChg>
+      <pc:sldChg chg="del">
+        <pc:chgData name="Christopher Turner" userId="108b2705a18cd39f" providerId="LiveId" clId="{D6C44517-C345-4DCA-92BC-26BBAFC02020}" dt="2024-07-25T19:20:31.092" v="127" actId="2696"/>
+        <pc:sldMkLst>
+          <pc:docMk/>
+          <pc:sldMk cId="1683866232" sldId="257"/>
+        </pc:sldMkLst>
+      </pc:sldChg>
       <pc:sldChg chg="modSp mod">
-        <pc:chgData name="Christopher Turner" userId="108b2705a18cd39f" providerId="LiveId" clId="{55AC9312-E998-4403-AFE4-5A3F6F9DB2D4}" dt="2024-07-26T00:40:23.495" v="253" actId="20577"/>
+        <pc:chgData name="Christopher Turner" userId="108b2705a18cd39f" providerId="LiveId" clId="{D6C44517-C345-4DCA-92BC-26BBAFC02020}" dt="2024-07-25T19:32:29.466" v="666" actId="20577"/>
+        <pc:sldMkLst>
+          <pc:docMk/>
+          <pc:sldMk cId="2385032039" sldId="258"/>
+        </pc:sldMkLst>
+        <pc:spChg chg="mod">
+          <ac:chgData name="Christopher Turner" userId="108b2705a18cd39f" providerId="LiveId" clId="{D6C44517-C345-4DCA-92BC-26BBAFC02020}" dt="2024-07-25T19:32:00.052" v="658" actId="20577"/>
+          <ac:spMkLst>
+            <pc:docMk/>
+            <pc:sldMk cId="2385032039" sldId="258"/>
+            <ac:spMk id="2" creationId="{00000000-0000-0000-0000-000000000000}"/>
+          </ac:spMkLst>
+        </pc:spChg>
+        <pc:spChg chg="mod">
+          <ac:chgData name="Christopher Turner" userId="108b2705a18cd39f" providerId="LiveId" clId="{D6C44517-C345-4DCA-92BC-26BBAFC02020}" dt="2024-07-25T19:32:29.466" v="666" actId="20577"/>
+          <ac:spMkLst>
+            <pc:docMk/>
+            <pc:sldMk cId="2385032039" sldId="258"/>
+            <ac:spMk id="3" creationId="{00000000-0000-0000-0000-000000000000}"/>
+          </ac:spMkLst>
+        </pc:spChg>
+      </pc:sldChg>
+      <pc:sldChg chg="addSp delSp modSp mod">
+        <pc:chgData name="Christopher Turner" userId="108b2705a18cd39f" providerId="LiveId" clId="{D6C44517-C345-4DCA-92BC-26BBAFC02020}" dt="2024-07-25T19:30:10.700" v="607" actId="478"/>
         <pc:sldMkLst>
           <pc:docMk/>
           <pc:sldMk cId="3382765918" sldId="259"/>
         </pc:sldMkLst>
         <pc:spChg chg="mod">
-          <ac:chgData name="Christopher Turner" userId="108b2705a18cd39f" providerId="LiveId" clId="{55AC9312-E998-4403-AFE4-5A3F6F9DB2D4}" dt="2024-07-26T00:40:23.495" v="253" actId="20577"/>
+          <ac:chgData name="Christopher Turner" userId="108b2705a18cd39f" providerId="LiveId" clId="{D6C44517-C345-4DCA-92BC-26BBAFC02020}" dt="2024-07-25T19:22:54.742" v="255" actId="1076"/>
+          <ac:spMkLst>
+            <pc:docMk/>
+            <pc:sldMk cId="3382765918" sldId="259"/>
+            <ac:spMk id="2" creationId="{00000000-0000-0000-0000-000000000000}"/>
+          </ac:spMkLst>
+        </pc:spChg>
+        <pc:spChg chg="mod">
+          <ac:chgData name="Christopher Turner" userId="108b2705a18cd39f" providerId="LiveId" clId="{D6C44517-C345-4DCA-92BC-26BBAFC02020}" dt="2024-07-25T19:30:06.531" v="606" actId="6549"/>
           <ac:spMkLst>
             <pc:docMk/>
             <pc:sldMk cId="3382765918" sldId="259"/>
             <ac:spMk id="3" creationId="{00000000-0000-0000-0000-000000000000}"/>
           </ac:spMkLst>
         </pc:spChg>
+        <pc:spChg chg="add mod">
+          <ac:chgData name="Christopher Turner" userId="108b2705a18cd39f" providerId="LiveId" clId="{D6C44517-C345-4DCA-92BC-26BBAFC02020}" dt="2024-07-25T19:22:48.925" v="254" actId="1076"/>
+          <ac:spMkLst>
+            <pc:docMk/>
+            <pc:sldMk cId="3382765918" sldId="259"/>
+            <ac:spMk id="4" creationId="{6F78C5BD-FA19-F3BC-73FA-75F36732B267}"/>
+          </ac:spMkLst>
+        </pc:spChg>
+        <pc:spChg chg="add del mod">
+          <ac:chgData name="Christopher Turner" userId="108b2705a18cd39f" providerId="LiveId" clId="{D6C44517-C345-4DCA-92BC-26BBAFC02020}" dt="2024-07-25T19:30:10.700" v="607" actId="478"/>
+          <ac:spMkLst>
+            <pc:docMk/>
+            <pc:sldMk cId="3382765918" sldId="259"/>
+            <ac:spMk id="5" creationId="{92132502-712E-B746-93BC-F12428DF7D80}"/>
+          </ac:spMkLst>
+        </pc:spChg>
+        <pc:spChg chg="add">
+          <ac:chgData name="Christopher Turner" userId="108b2705a18cd39f" providerId="LiveId" clId="{D6C44517-C345-4DCA-92BC-26BBAFC02020}" dt="2024-07-25T19:26:07.359" v="312"/>
+          <ac:spMkLst>
+            <pc:docMk/>
+            <pc:sldMk cId="3382765918" sldId="259"/>
+            <ac:spMk id="6" creationId="{543EE461-4F3A-3A48-4EAA-C72D9B50C6A4}"/>
+          </ac:spMkLst>
+        </pc:spChg>
+        <pc:spChg chg="add">
+          <ac:chgData name="Christopher Turner" userId="108b2705a18cd39f" providerId="LiveId" clId="{D6C44517-C345-4DCA-92BC-26BBAFC02020}" dt="2024-07-25T19:26:10.785" v="313"/>
+          <ac:spMkLst>
+            <pc:docMk/>
+            <pc:sldMk cId="3382765918" sldId="259"/>
+            <ac:spMk id="7" creationId="{CF045A5C-8747-DF83-0AEE-CB1F05440876}"/>
+          </ac:spMkLst>
+        </pc:spChg>
       </pc:sldChg>
-      <pc:sldChg chg="addSp mod">
-        <pc:chgData name="Christopher Turner" userId="108b2705a18cd39f" providerId="LiveId" clId="{55AC9312-E998-4403-AFE4-5A3F6F9DB2D4}" dt="2024-07-26T00:27:46.829" v="22" actId="11529"/>
+      <pc:sldChg chg="del">
+        <pc:chgData name="Christopher Turner" userId="108b2705a18cd39f" providerId="LiveId" clId="{D6C44517-C345-4DCA-92BC-26BBAFC02020}" dt="2024-07-25T19:38:31.734" v="996" actId="2696"/>
+        <pc:sldMkLst>
+          <pc:docMk/>
+          <pc:sldMk cId="2361836093" sldId="260"/>
+        </pc:sldMkLst>
+      </pc:sldChg>
+      <pc:sldChg chg="addSp delSp modSp mod">
+        <pc:chgData name="Christopher Turner" userId="108b2705a18cd39f" providerId="LiveId" clId="{D6C44517-C345-4DCA-92BC-26BBAFC02020}" dt="2024-07-25T20:18:55.664" v="1918" actId="20577"/>
+        <pc:sldMkLst>
+          <pc:docMk/>
+          <pc:sldMk cId="3291260535" sldId="261"/>
+        </pc:sldMkLst>
+        <pc:spChg chg="add del mod">
+          <ac:chgData name="Christopher Turner" userId="108b2705a18cd39f" providerId="LiveId" clId="{D6C44517-C345-4DCA-92BC-26BBAFC02020}" dt="2024-07-25T20:18:55.664" v="1918" actId="20577"/>
+          <ac:spMkLst>
+            <pc:docMk/>
+            <pc:sldMk cId="3291260535" sldId="261"/>
+            <ac:spMk id="3" creationId="{00000000-0000-0000-0000-000000000000}"/>
+          </ac:spMkLst>
+        </pc:spChg>
+        <pc:graphicFrameChg chg="add mod">
+          <ac:chgData name="Christopher Turner" userId="108b2705a18cd39f" providerId="LiveId" clId="{D6C44517-C345-4DCA-92BC-26BBAFC02020}" dt="2024-07-25T19:31:15.383" v="624"/>
+          <ac:graphicFrameMkLst>
+            <pc:docMk/>
+            <pc:sldMk cId="3291260535" sldId="261"/>
+            <ac:graphicFrameMk id="4" creationId="{E767D679-C6CE-0B9B-9DE0-025A33068BC2}"/>
+          </ac:graphicFrameMkLst>
+        </pc:graphicFrameChg>
+      </pc:sldChg>
+      <pc:sldChg chg="modSp add mod">
+        <pc:chgData name="Christopher Turner" userId="108b2705a18cd39f" providerId="LiveId" clId="{D6C44517-C345-4DCA-92BC-26BBAFC02020}" dt="2024-07-25T20:24:49.168" v="1923"/>
+        <pc:sldMkLst>
+          <pc:docMk/>
+          <pc:sldMk cId="2661206592" sldId="262"/>
+        </pc:sldMkLst>
+        <pc:spChg chg="mod">
+          <ac:chgData name="Christopher Turner" userId="108b2705a18cd39f" providerId="LiveId" clId="{D6C44517-C345-4DCA-92BC-26BBAFC02020}" dt="2024-07-25T19:38:16.095" v="994" actId="20577"/>
+          <ac:spMkLst>
+            <pc:docMk/>
+            <pc:sldMk cId="2661206592" sldId="262"/>
+            <ac:spMk id="2" creationId="{00000000-0000-0000-0000-000000000000}"/>
+          </ac:spMkLst>
+        </pc:spChg>
+        <pc:spChg chg="mod">
+          <ac:chgData name="Christopher Turner" userId="108b2705a18cd39f" providerId="LiveId" clId="{D6C44517-C345-4DCA-92BC-26BBAFC02020}" dt="2024-07-25T20:24:49.168" v="1923"/>
+          <ac:spMkLst>
+            <pc:docMk/>
+            <pc:sldMk cId="2661206592" sldId="262"/>
+            <ac:spMk id="3" creationId="{00000000-0000-0000-0000-000000000000}"/>
+          </ac:spMkLst>
+        </pc:spChg>
+        <pc:spChg chg="mod">
+          <ac:chgData name="Christopher Turner" userId="108b2705a18cd39f" providerId="LiveId" clId="{D6C44517-C345-4DCA-92BC-26BBAFC02020}" dt="2024-07-25T19:37:15.524" v="908" actId="20577"/>
+          <ac:spMkLst>
+            <pc:docMk/>
+            <pc:sldMk cId="2661206592" sldId="262"/>
+            <ac:spMk id="4" creationId="{6F78C5BD-FA19-F3BC-73FA-75F36732B267}"/>
+          </ac:spMkLst>
+        </pc:spChg>
+      </pc:sldChg>
+      <pc:sldChg chg="modSp add mod">
+        <pc:chgData name="Christopher Turner" userId="108b2705a18cd39f" providerId="LiveId" clId="{D6C44517-C345-4DCA-92BC-26BBAFC02020}" dt="2024-07-25T20:24:51.962" v="1924"/>
+        <pc:sldMkLst>
+          <pc:docMk/>
+          <pc:sldMk cId="4218281971" sldId="263"/>
+        </pc:sldMkLst>
+        <pc:spChg chg="mod">
+          <ac:chgData name="Christopher Turner" userId="108b2705a18cd39f" providerId="LiveId" clId="{D6C44517-C345-4DCA-92BC-26BBAFC02020}" dt="2024-07-25T19:38:09.714" v="969" actId="20577"/>
+          <ac:spMkLst>
+            <pc:docMk/>
+            <pc:sldMk cId="4218281971" sldId="263"/>
+            <ac:spMk id="2" creationId="{00000000-0000-0000-0000-000000000000}"/>
+          </ac:spMkLst>
+        </pc:spChg>
+        <pc:spChg chg="mod">
+          <ac:chgData name="Christopher Turner" userId="108b2705a18cd39f" providerId="LiveId" clId="{D6C44517-C345-4DCA-92BC-26BBAFC02020}" dt="2024-07-25T20:24:51.962" v="1924"/>
+          <ac:spMkLst>
+            <pc:docMk/>
+            <pc:sldMk cId="4218281971" sldId="263"/>
+            <ac:spMk id="3" creationId="{00000000-0000-0000-0000-000000000000}"/>
+          </ac:spMkLst>
+        </pc:spChg>
+        <pc:spChg chg="mod">
+          <ac:chgData name="Christopher Turner" userId="108b2705a18cd39f" providerId="LiveId" clId="{D6C44517-C345-4DCA-92BC-26BBAFC02020}" dt="2024-07-25T19:37:43.383" v="916" actId="20577"/>
+          <ac:spMkLst>
+            <pc:docMk/>
+            <pc:sldMk cId="4218281971" sldId="263"/>
+            <ac:spMk id="4" creationId="{6F78C5BD-FA19-F3BC-73FA-75F36732B267}"/>
+          </ac:spMkLst>
+        </pc:spChg>
+      </pc:sldChg>
+      <pc:sldChg chg="modSp add mod ord">
+        <pc:chgData name="Christopher Turner" userId="108b2705a18cd39f" providerId="LiveId" clId="{D6C44517-C345-4DCA-92BC-26BBAFC02020}" dt="2024-07-25T20:24:40.356" v="1922" actId="20577"/>
+        <pc:sldMkLst>
+          <pc:docMk/>
+          <pc:sldMk cId="4191233258" sldId="264"/>
+        </pc:sldMkLst>
+        <pc:spChg chg="mod">
+          <ac:chgData name="Christopher Turner" userId="108b2705a18cd39f" providerId="LiveId" clId="{D6C44517-C345-4DCA-92BC-26BBAFC02020}" dt="2024-07-25T19:37:59.660" v="947" actId="6549"/>
+          <ac:spMkLst>
+            <pc:docMk/>
+            <pc:sldMk cId="4191233258" sldId="264"/>
+            <ac:spMk id="2" creationId="{00000000-0000-0000-0000-000000000000}"/>
+          </ac:spMkLst>
+        </pc:spChg>
+        <pc:spChg chg="mod">
+          <ac:chgData name="Christopher Turner" userId="108b2705a18cd39f" providerId="LiveId" clId="{D6C44517-C345-4DCA-92BC-26BBAFC02020}" dt="2024-07-25T20:24:40.356" v="1922" actId="20577"/>
+          <ac:spMkLst>
+            <pc:docMk/>
+            <pc:sldMk cId="4191233258" sldId="264"/>
+            <ac:spMk id="3" creationId="{00000000-0000-0000-0000-000000000000}"/>
+          </ac:spMkLst>
+        </pc:spChg>
+        <pc:spChg chg="mod">
+          <ac:chgData name="Christopher Turner" userId="108b2705a18cd39f" providerId="LiveId" clId="{D6C44517-C345-4DCA-92BC-26BBAFC02020}" dt="2024-07-25T19:37:48.826" v="921" actId="20577"/>
+          <ac:spMkLst>
+            <pc:docMk/>
+            <pc:sldMk cId="4191233258" sldId="264"/>
+            <ac:spMk id="4" creationId="{6F78C5BD-FA19-F3BC-73FA-75F36732B267}"/>
+          </ac:spMkLst>
+        </pc:spChg>
+      </pc:sldChg>
+      <pc:sldChg chg="addSp modSp add mod">
+        <pc:chgData name="Christopher Turner" userId="108b2705a18cd39f" providerId="LiveId" clId="{D6C44517-C345-4DCA-92BC-26BBAFC02020}" dt="2024-07-25T19:46:49.951" v="1488"/>
+        <pc:sldMkLst>
+          <pc:docMk/>
+          <pc:sldMk cId="77602882" sldId="265"/>
+        </pc:sldMkLst>
+        <pc:spChg chg="mod">
+          <ac:chgData name="Christopher Turner" userId="108b2705a18cd39f" providerId="LiveId" clId="{D6C44517-C345-4DCA-92BC-26BBAFC02020}" dt="2024-07-25T19:38:41.875" v="1033" actId="20577"/>
+          <ac:spMkLst>
+            <pc:docMk/>
+            <pc:sldMk cId="77602882" sldId="265"/>
+            <ac:spMk id="2" creationId="{00000000-0000-0000-0000-000000000000}"/>
+          </ac:spMkLst>
+        </pc:spChg>
+        <pc:spChg chg="mod">
+          <ac:chgData name="Christopher Turner" userId="108b2705a18cd39f" providerId="LiveId" clId="{D6C44517-C345-4DCA-92BC-26BBAFC02020}" dt="2024-07-25T19:39:12.300" v="1079" actId="20577"/>
+          <ac:spMkLst>
+            <pc:docMk/>
+            <pc:sldMk cId="77602882" sldId="265"/>
+            <ac:spMk id="3" creationId="{00000000-0000-0000-0000-000000000000}"/>
+          </ac:spMkLst>
+        </pc:spChg>
+        <pc:spChg chg="mod">
+          <ac:chgData name="Christopher Turner" userId="108b2705a18cd39f" providerId="LiveId" clId="{D6C44517-C345-4DCA-92BC-26BBAFC02020}" dt="2024-07-25T19:45:27.579" v="1487" actId="20577"/>
+          <ac:spMkLst>
+            <pc:docMk/>
+            <pc:sldMk cId="77602882" sldId="265"/>
+            <ac:spMk id="4" creationId="{6F78C5BD-FA19-F3BC-73FA-75F36732B267}"/>
+          </ac:spMkLst>
+        </pc:spChg>
+        <pc:spChg chg="add">
+          <ac:chgData name="Christopher Turner" userId="108b2705a18cd39f" providerId="LiveId" clId="{D6C44517-C345-4DCA-92BC-26BBAFC02020}" dt="2024-07-25T19:46:49.951" v="1488"/>
+          <ac:spMkLst>
+            <pc:docMk/>
+            <pc:sldMk cId="77602882" sldId="265"/>
+            <ac:spMk id="5" creationId="{BA5DC2C7-4EC1-91D1-04DB-0268B58EF734}"/>
+          </ac:spMkLst>
+        </pc:spChg>
+      </pc:sldChg>
+      <pc:sldChg chg="add del">
+        <pc:chgData name="Christopher Turner" userId="108b2705a18cd39f" providerId="LiveId" clId="{D6C44517-C345-4DCA-92BC-26BBAFC02020}" dt="2024-07-25T19:39:23.194" v="1081" actId="2890"/>
+        <pc:sldMkLst>
+          <pc:docMk/>
+          <pc:sldMk cId="242601211" sldId="266"/>
+        </pc:sldMkLst>
+      </pc:sldChg>
+      <pc:sldChg chg="modSp new mod ord">
+        <pc:chgData name="Christopher Turner" userId="108b2705a18cd39f" providerId="LiveId" clId="{D6C44517-C345-4DCA-92BC-26BBAFC02020}" dt="2024-07-25T19:43:02.996" v="1373"/>
         <pc:sldMkLst>
           <pc:docMk/>
           <pc:sldMk cId="2357912295" sldId="266"/>
         </pc:sldMkLst>
-        <pc:spChg chg="add">
-          <ac:chgData name="Christopher Turner" userId="108b2705a18cd39f" providerId="LiveId" clId="{55AC9312-E998-4403-AFE4-5A3F6F9DB2D4}" dt="2024-07-26T00:27:46.829" v="22" actId="11529"/>
+        <pc:spChg chg="mod">
+          <ac:chgData name="Christopher Turner" userId="108b2705a18cd39f" providerId="LiveId" clId="{D6C44517-C345-4DCA-92BC-26BBAFC02020}" dt="2024-07-25T19:40:53.758" v="1270" actId="20577"/>
           <ac:spMkLst>
             <pc:docMk/>
             <pc:sldMk cId="2357912295" sldId="266"/>
-            <ac:spMk id="4" creationId="{F1016C3E-913B-FD80-80AD-1BB04C427B36}"/>
+            <ac:spMk id="2" creationId="{3D7B3BD4-ECBA-DED0-C9B9-A577AF386EB5}"/>
+          </ac:spMkLst>
+        </pc:spChg>
+        <pc:spChg chg="mod">
+          <ac:chgData name="Christopher Turner" userId="108b2705a18cd39f" providerId="LiveId" clId="{D6C44517-C345-4DCA-92BC-26BBAFC02020}" dt="2024-07-25T19:40:47.435" v="1262" actId="20577"/>
+          <ac:spMkLst>
+            <pc:docMk/>
+            <pc:sldMk cId="2357912295" sldId="266"/>
+            <ac:spMk id="3" creationId="{F95E2A37-E369-BD1A-E50B-B049F9C4C2CC}"/>
           </ac:spMkLst>
         </pc:spChg>
       </pc:sldChg>
-      <pc:sldChg chg="modSp mod">
-        <pc:chgData name="Christopher Turner" userId="108b2705a18cd39f" providerId="LiveId" clId="{55AC9312-E998-4403-AFE4-5A3F6F9DB2D4}" dt="2024-07-25T23:43:52.927" v="21" actId="20577"/>
+      <pc:sldChg chg="modSp add mod ord">
+        <pc:chgData name="Christopher Turner" userId="108b2705a18cd39f" providerId="LiveId" clId="{D6C44517-C345-4DCA-92BC-26BBAFC02020}" dt="2024-07-25T19:43:12.129" v="1375"/>
+        <pc:sldMkLst>
+          <pc:docMk/>
+          <pc:sldMk cId="695019442" sldId="267"/>
+        </pc:sldMkLst>
+        <pc:spChg chg="mod">
+          <ac:chgData name="Christopher Turner" userId="108b2705a18cd39f" providerId="LiveId" clId="{D6C44517-C345-4DCA-92BC-26BBAFC02020}" dt="2024-07-25T19:40:58.685" v="1272" actId="20577"/>
+          <ac:spMkLst>
+            <pc:docMk/>
+            <pc:sldMk cId="695019442" sldId="267"/>
+            <ac:spMk id="2" creationId="{3D7B3BD4-ECBA-DED0-C9B9-A577AF386EB5}"/>
+          </ac:spMkLst>
+        </pc:spChg>
+      </pc:sldChg>
+      <pc:sldChg chg="modSp add mod ord">
+        <pc:chgData name="Christopher Turner" userId="108b2705a18cd39f" providerId="LiveId" clId="{D6C44517-C345-4DCA-92BC-26BBAFC02020}" dt="2024-07-25T19:43:44.415" v="1391" actId="20577"/>
+        <pc:sldMkLst>
+          <pc:docMk/>
+          <pc:sldMk cId="3298747479" sldId="268"/>
+        </pc:sldMkLst>
+        <pc:spChg chg="mod">
+          <ac:chgData name="Christopher Turner" userId="108b2705a18cd39f" providerId="LiveId" clId="{D6C44517-C345-4DCA-92BC-26BBAFC02020}" dt="2024-07-25T19:43:44.415" v="1391" actId="20577"/>
+          <ac:spMkLst>
+            <pc:docMk/>
+            <pc:sldMk cId="3298747479" sldId="268"/>
+            <ac:spMk id="2" creationId="{3D7B3BD4-ECBA-DED0-C9B9-A577AF386EB5}"/>
+          </ac:spMkLst>
+        </pc:spChg>
+      </pc:sldChg>
+      <pc:sldChg chg="modSp add mod">
+        <pc:chgData name="Christopher Turner" userId="108b2705a18cd39f" providerId="LiveId" clId="{D6C44517-C345-4DCA-92BC-26BBAFC02020}" dt="2024-07-25T19:41:23.615" v="1296" actId="20577"/>
+        <pc:sldMkLst>
+          <pc:docMk/>
+          <pc:sldMk cId="232526807" sldId="269"/>
+        </pc:sldMkLst>
+        <pc:spChg chg="mod">
+          <ac:chgData name="Christopher Turner" userId="108b2705a18cd39f" providerId="LiveId" clId="{D6C44517-C345-4DCA-92BC-26BBAFC02020}" dt="2024-07-25T19:41:23.615" v="1296" actId="20577"/>
+          <ac:spMkLst>
+            <pc:docMk/>
+            <pc:sldMk cId="232526807" sldId="269"/>
+            <ac:spMk id="2" creationId="{3D7B3BD4-ECBA-DED0-C9B9-A577AF386EB5}"/>
+          </ac:spMkLst>
+        </pc:spChg>
+      </pc:sldChg>
+      <pc:sldChg chg="add">
+        <pc:chgData name="Christopher Turner" userId="108b2705a18cd39f" providerId="LiveId" clId="{D6C44517-C345-4DCA-92BC-26BBAFC02020}" dt="2024-07-25T19:43:31.155" v="1376" actId="2890"/>
+        <pc:sldMkLst>
+          <pc:docMk/>
+          <pc:sldMk cId="2249364170" sldId="270"/>
+        </pc:sldMkLst>
+      </pc:sldChg>
+      <pc:sldChg chg="modSp add mod">
+        <pc:chgData name="Christopher Turner" userId="108b2705a18cd39f" providerId="LiveId" clId="{D6C44517-C345-4DCA-92BC-26BBAFC02020}" dt="2024-07-25T19:44:00.134" v="1394" actId="20577"/>
         <pc:sldMkLst>
           <pc:docMk/>
           <pc:sldMk cId="1221097782" sldId="271"/>
         </pc:sldMkLst>
         <pc:spChg chg="mod">
-          <ac:chgData name="Christopher Turner" userId="108b2705a18cd39f" providerId="LiveId" clId="{55AC9312-E998-4403-AFE4-5A3F6F9DB2D4}" dt="2024-07-25T23:43:52.927" v="21" actId="20577"/>
+          <ac:chgData name="Christopher Turner" userId="108b2705a18cd39f" providerId="LiveId" clId="{D6C44517-C345-4DCA-92BC-26BBAFC02020}" dt="2024-07-25T19:44:00.134" v="1394" actId="20577"/>
           <ac:spMkLst>
             <pc:docMk/>
             <pc:sldMk cId="1221097782" sldId="271"/>
             <ac:spMk id="2" creationId="{3D7B3BD4-ECBA-DED0-C9B9-A577AF386EB5}"/>
           </ac:spMkLst>
         </pc:spChg>
+      </pc:sldChg>
+      <pc:sldChg chg="modSp add mod">
+        <pc:chgData name="Christopher Turner" userId="108b2705a18cd39f" providerId="LiveId" clId="{D6C44517-C345-4DCA-92BC-26BBAFC02020}" dt="2024-07-25T20:25:37.664" v="2012" actId="20577"/>
+        <pc:sldMkLst>
+          <pc:docMk/>
+          <pc:sldMk cId="3624028729" sldId="272"/>
+        </pc:sldMkLst>
+        <pc:spChg chg="mod">
+          <ac:chgData name="Christopher Turner" userId="108b2705a18cd39f" providerId="LiveId" clId="{D6C44517-C345-4DCA-92BC-26BBAFC02020}" dt="2024-07-25T19:49:07.729" v="1717" actId="20577"/>
+          <ac:spMkLst>
+            <pc:docMk/>
+            <pc:sldMk cId="3624028729" sldId="272"/>
+            <ac:spMk id="2" creationId="{00000000-0000-0000-0000-000000000000}"/>
+          </ac:spMkLst>
+        </pc:spChg>
+        <pc:spChg chg="mod">
+          <ac:chgData name="Christopher Turner" userId="108b2705a18cd39f" providerId="LiveId" clId="{D6C44517-C345-4DCA-92BC-26BBAFC02020}" dt="2024-07-25T20:25:37.664" v="2012" actId="20577"/>
+          <ac:spMkLst>
+            <pc:docMk/>
+            <pc:sldMk cId="3624028729" sldId="272"/>
+            <ac:spMk id="3" creationId="{00000000-0000-0000-0000-000000000000}"/>
+          </ac:spMkLst>
+        </pc:spChg>
+      </pc:sldChg>
+    </pc:docChg>
+  </pc:docChgLst>
+  <pc:docChgLst>
+    <pc:chgData name="Christopher Turner" userId="108b2705a18cd39f" providerId="LiveId" clId="{4FE8CBD7-78BF-4B93-AD3E-27E34B92CF03}"/>
+    <pc:docChg chg="undo custSel modSld">
+      <pc:chgData name="Christopher Turner" userId="108b2705a18cd39f" providerId="LiveId" clId="{4FE8CBD7-78BF-4B93-AD3E-27E34B92CF03}" dt="2024-07-29T22:00:05.212" v="44" actId="1035"/>
+      <pc:docMkLst>
+        <pc:docMk/>
+      </pc:docMkLst>
+      <pc:sldChg chg="addSp delSp modSp mod">
+        <pc:chgData name="Christopher Turner" userId="108b2705a18cd39f" providerId="LiveId" clId="{4FE8CBD7-78BF-4B93-AD3E-27E34B92CF03}" dt="2024-07-29T22:00:05.212" v="44" actId="1035"/>
+        <pc:sldMkLst>
+          <pc:docMk/>
+          <pc:sldMk cId="81684999" sldId="276"/>
+        </pc:sldMkLst>
+        <pc:spChg chg="mod">
+          <ac:chgData name="Christopher Turner" userId="108b2705a18cd39f" providerId="LiveId" clId="{4FE8CBD7-78BF-4B93-AD3E-27E34B92CF03}" dt="2024-07-29T21:59:41.860" v="31" actId="1076"/>
+          <ac:spMkLst>
+            <pc:docMk/>
+            <pc:sldMk cId="81684999" sldId="276"/>
+            <ac:spMk id="3" creationId="{F95E2A37-E369-BD1A-E50B-B049F9C4C2CC}"/>
+          </ac:spMkLst>
+        </pc:spChg>
+        <pc:spChg chg="mod">
+          <ac:chgData name="Christopher Turner" userId="108b2705a18cd39f" providerId="LiveId" clId="{4FE8CBD7-78BF-4B93-AD3E-27E34B92CF03}" dt="2024-07-29T21:56:23.950" v="0" actId="20577"/>
+          <ac:spMkLst>
+            <pc:docMk/>
+            <pc:sldMk cId="81684999" sldId="276"/>
+            <ac:spMk id="10" creationId="{DBEC776E-E2BB-CC44-1EA1-744B77246396}"/>
+          </ac:spMkLst>
+        </pc:spChg>
+        <pc:spChg chg="mod">
+          <ac:chgData name="Christopher Turner" userId="108b2705a18cd39f" providerId="LiveId" clId="{4FE8CBD7-78BF-4B93-AD3E-27E34B92CF03}" dt="2024-07-29T22:00:01.797" v="39" actId="14100"/>
+          <ac:spMkLst>
+            <pc:docMk/>
+            <pc:sldMk cId="81684999" sldId="276"/>
+            <ac:spMk id="18" creationId="{34C3CB71-02F5-6B27-265E-AF122730097B}"/>
+          </ac:spMkLst>
+        </pc:spChg>
+        <pc:grpChg chg="add del">
+          <ac:chgData name="Christopher Turner" userId="108b2705a18cd39f" providerId="LiveId" clId="{4FE8CBD7-78BF-4B93-AD3E-27E34B92CF03}" dt="2024-07-29T21:59:29.671" v="26" actId="478"/>
+          <ac:grpSpMkLst>
+            <pc:docMk/>
+            <pc:sldMk cId="81684999" sldId="276"/>
+            <ac:grpSpMk id="8" creationId="{DDEBE423-5BB0-1151-5816-6C62721B10A5}"/>
+          </ac:grpSpMkLst>
+        </pc:grpChg>
+        <pc:picChg chg="add del mod">
+          <ac:chgData name="Christopher Turner" userId="108b2705a18cd39f" providerId="LiveId" clId="{4FE8CBD7-78BF-4B93-AD3E-27E34B92CF03}" dt="2024-07-29T21:58:33.813" v="20" actId="478"/>
+          <ac:picMkLst>
+            <pc:docMk/>
+            <pc:sldMk cId="81684999" sldId="276"/>
+            <ac:picMk id="4" creationId="{545162EB-87CC-5B77-91DC-5C2AE176BF52}"/>
+          </ac:picMkLst>
+        </pc:picChg>
+        <pc:picChg chg="add mod">
+          <ac:chgData name="Christopher Turner" userId="108b2705a18cd39f" providerId="LiveId" clId="{4FE8CBD7-78BF-4B93-AD3E-27E34B92CF03}" dt="2024-07-29T22:00:05.212" v="44" actId="1035"/>
+          <ac:picMkLst>
+            <pc:docMk/>
+            <pc:sldMk cId="81684999" sldId="276"/>
+            <ac:picMk id="7" creationId="{8AD21E31-BAAC-48BF-5E38-922BAE70807D}"/>
+          </ac:picMkLst>
+        </pc:picChg>
       </pc:sldChg>
     </pc:docChg>
   </pc:docChgLst>
@@ -7107,7 +7172,7 @@
         </p:nvSpPr>
         <p:spPr>
           <a:xfrm>
-            <a:off x="173881" y="1075451"/>
+            <a:off x="173881" y="622370"/>
             <a:ext cx="5348553" cy="736872"/>
           </a:xfrm>
         </p:spPr>
@@ -7249,122 +7314,6 @@
           </a:p>
         </p:txBody>
       </p:sp>
-      <p:grpSp>
-        <p:nvGrpSpPr>
-          <p:cNvPr id="8" name="Group 7">
-            <a:extLst>
-              <a:ext uri="{FF2B5EF4-FFF2-40B4-BE49-F238E27FC236}">
-                <a16:creationId xmlns:a16="http://schemas.microsoft.com/office/drawing/2014/main" id="{DDEBE423-5BB0-1151-5816-6C62721B10A5}"/>
-              </a:ext>
-            </a:extLst>
-          </p:cNvPr>
-          <p:cNvGrpSpPr/>
-          <p:nvPr/>
-        </p:nvGrpSpPr>
-        <p:grpSpPr>
-          <a:xfrm>
-            <a:off x="173882" y="2150076"/>
-            <a:ext cx="5156000" cy="4707924"/>
-            <a:chOff x="0" y="0"/>
-            <a:chExt cx="2807970" cy="2714625"/>
-          </a:xfrm>
-        </p:grpSpPr>
-        <p:pic>
-          <p:nvPicPr>
-            <p:cNvPr id="9" name="Picture 8">
-              <a:extLst>
-                <a:ext uri="{FF2B5EF4-FFF2-40B4-BE49-F238E27FC236}">
-                  <a16:creationId xmlns:a16="http://schemas.microsoft.com/office/drawing/2014/main" id="{D8B162F7-42C6-43D7-1705-F9C62383C721}"/>
-                </a:ext>
-              </a:extLst>
-            </p:cNvPr>
-            <p:cNvPicPr>
-              <a:picLocks noChangeAspect="1"/>
-            </p:cNvPicPr>
-            <p:nvPr/>
-          </p:nvPicPr>
-          <p:blipFill>
-            <a:blip r:embed="rId2">
-              <a:extLst>
-                <a:ext uri="{28A0092B-C50C-407E-A947-70E740481C1C}">
-                  <a14:useLocalDpi xmlns:a14="http://schemas.microsoft.com/office/drawing/2010/main" val="0"/>
-                </a:ext>
-              </a:extLst>
-            </a:blip>
-            <a:stretch>
-              <a:fillRect/>
-            </a:stretch>
-          </p:blipFill>
-          <p:spPr>
-            <a:xfrm>
-              <a:off x="0" y="0"/>
-              <a:ext cx="2807970" cy="2390775"/>
-            </a:xfrm>
-            <a:prstGeom prst="rect">
-              <a:avLst/>
-            </a:prstGeom>
-          </p:spPr>
-        </p:pic>
-        <p:sp>
-          <p:nvSpPr>
-            <p:cNvPr id="10" name="Text Box 1">
-              <a:extLst>
-                <a:ext uri="{FF2B5EF4-FFF2-40B4-BE49-F238E27FC236}">
-                  <a16:creationId xmlns:a16="http://schemas.microsoft.com/office/drawing/2014/main" id="{DBEC776E-E2BB-CC44-1EA1-744B77246396}"/>
-                </a:ext>
-              </a:extLst>
-            </p:cNvPr>
-            <p:cNvSpPr txBox="1"/>
-            <p:nvPr/>
-          </p:nvSpPr>
-          <p:spPr>
-            <a:xfrm>
-              <a:off x="0" y="2447925"/>
-              <a:ext cx="2807970" cy="266700"/>
-            </a:xfrm>
-            <a:prstGeom prst="rect">
-              <a:avLst/>
-            </a:prstGeom>
-            <a:solidFill>
-              <a:prstClr val="white"/>
-            </a:solidFill>
-            <a:ln>
-              <a:noFill/>
-            </a:ln>
-          </p:spPr>
-          <p:txBody>
-            <a:bodyPr rot="0" spcFirstLastPara="0" vert="horz" wrap="square" lIns="0" tIns="0" rIns="0" bIns="0" numCol="1" spcCol="0" rtlCol="0" fromWordArt="0" anchor="t" anchorCtr="0" forceAA="0" compatLnSpc="1">
-              <a:prstTxWarp prst="textNoShape">
-                <a:avLst/>
-              </a:prstTxWarp>
-              <a:spAutoFit/>
-            </a:bodyPr>
-            <a:lstStyle/>
-            <a:p>
-              <a:pPr marL="0" marR="0">
-                <a:spcBef>
-                  <a:spcPts val="0"/>
-                </a:spcBef>
-                <a:spcAft>
-                  <a:spcPts val="1000"/>
-                </a:spcAft>
-              </a:pPr>
-              <a:r>
-                <a:rPr lang="en-US" sz="900" i="1" kern="100">
-                  <a:solidFill>
-                    <a:srgbClr val="44546A"/>
-                  </a:solidFill>
-                  <a:effectLst/>
-                  <a:latin typeface="Calibri" panose="020F0502020204030204" pitchFamily="34" charset="0"/>
-                  <a:ea typeface="Calibri" panose="020F0502020204030204" pitchFamily="34" charset="0"/>
-                  <a:cs typeface="Times New Roman" panose="02020603050405020304" pitchFamily="18" charset="0"/>
-                </a:rPr>
-                <a:t>Figure 6 Drama dominates, with 1/5 of the entire market.</a:t>
-              </a:r>
-            </a:p>
-          </p:txBody>
-        </p:sp>
-      </p:grpSp>
       <p:pic>
         <p:nvPicPr>
           <p:cNvPr id="16" name="Picture 15" descr="A pie chart with different colored circles&#10;&#10;Description automatically generated">
@@ -7380,7 +7329,7 @@
           <p:nvPr/>
         </p:nvPicPr>
         <p:blipFill>
-          <a:blip r:embed="rId3"/>
+          <a:blip r:embed="rId2"/>
           <a:stretch>
             <a:fillRect/>
           </a:stretch>
@@ -7411,8 +7360,8 @@
         </p:nvSpPr>
         <p:spPr>
           <a:xfrm>
-            <a:off x="5609968" y="5520910"/>
-            <a:ext cx="6334897" cy="733855"/>
+            <a:off x="5884082" y="5520910"/>
+            <a:ext cx="6307918" cy="733855"/>
           </a:xfrm>
           <a:prstGeom prst="rect">
             <a:avLst/>
@@ -7634,6 +7583,36 @@
           </a:p>
         </p:txBody>
       </p:sp>
+      <p:pic>
+        <p:nvPicPr>
+          <p:cNvPr id="7" name="Picture 6" descr="A colorful pie chart with text&#10;&#10;Description automatically generated">
+            <a:extLst>
+              <a:ext uri="{FF2B5EF4-FFF2-40B4-BE49-F238E27FC236}">
+                <a16:creationId xmlns:a16="http://schemas.microsoft.com/office/drawing/2014/main" id="{8AD21E31-BAAC-48BF-5E38-922BAE70807D}"/>
+              </a:ext>
+            </a:extLst>
+          </p:cNvPr>
+          <p:cNvPicPr>
+            <a:picLocks noChangeAspect="1"/>
+          </p:cNvPicPr>
+          <p:nvPr/>
+        </p:nvPicPr>
+        <p:blipFill>
+          <a:blip r:embed="rId3"/>
+          <a:stretch>
+            <a:fillRect/>
+          </a:stretch>
+        </p:blipFill>
+        <p:spPr>
+          <a:xfrm>
+            <a:off x="173881" y="1378775"/>
+            <a:ext cx="5710201" cy="5234801"/>
+          </a:xfrm>
+          <a:prstGeom prst="rect">
+            <a:avLst/>
+          </a:prstGeom>
+        </p:spPr>
+      </p:pic>
     </p:spTree>
     <p:extLst>
       <p:ext uri="{BB962C8B-B14F-4D97-AF65-F5344CB8AC3E}">

</xml_diff>

<commit_message>
a few last updates and comment clarifications
</commit_message>
<xml_diff>
--- a/MoMoviesClassPresentation.pptx
+++ b/MoMoviesClassPresentation.pptx
@@ -1559,12 +1559,12 @@
   <pc:docChgLst>
     <pc:chgData name="Christopher Turner" userId="108b2705a18cd39f" providerId="LiveId" clId="{4FE8CBD7-78BF-4B93-AD3E-27E34B92CF03}"/>
     <pc:docChg chg="undo custSel modSld">
-      <pc:chgData name="Christopher Turner" userId="108b2705a18cd39f" providerId="LiveId" clId="{4FE8CBD7-78BF-4B93-AD3E-27E34B92CF03}" dt="2024-07-29T22:00:05.212" v="44" actId="1035"/>
+      <pc:chgData name="Christopher Turner" userId="108b2705a18cd39f" providerId="LiveId" clId="{4FE8CBD7-78BF-4B93-AD3E-27E34B92CF03}" dt="2024-07-29T22:08:59.279" v="111" actId="1076"/>
       <pc:docMkLst>
         <pc:docMk/>
       </pc:docMkLst>
       <pc:sldChg chg="addSp delSp modSp mod">
-        <pc:chgData name="Christopher Turner" userId="108b2705a18cd39f" providerId="LiveId" clId="{4FE8CBD7-78BF-4B93-AD3E-27E34B92CF03}" dt="2024-07-29T22:00:05.212" v="44" actId="1035"/>
+        <pc:chgData name="Christopher Turner" userId="108b2705a18cd39f" providerId="LiveId" clId="{4FE8CBD7-78BF-4B93-AD3E-27E34B92CF03}" dt="2024-07-29T22:08:39.236" v="75" actId="1037"/>
         <pc:sldMkLst>
           <pc:docMk/>
           <pc:sldMk cId="81684999" sldId="276"/>
@@ -1578,6 +1578,14 @@
           </ac:spMkLst>
         </pc:spChg>
         <pc:spChg chg="mod">
+          <ac:chgData name="Christopher Turner" userId="108b2705a18cd39f" providerId="LiveId" clId="{4FE8CBD7-78BF-4B93-AD3E-27E34B92CF03}" dt="2024-07-29T22:08:39.236" v="75" actId="1037"/>
+          <ac:spMkLst>
+            <pc:docMk/>
+            <pc:sldMk cId="81684999" sldId="276"/>
+            <ac:spMk id="6" creationId="{4104B51A-6C83-3663-1160-E079108B01E5}"/>
+          </ac:spMkLst>
+        </pc:spChg>
+        <pc:spChg chg="mod">
           <ac:chgData name="Christopher Turner" userId="108b2705a18cd39f" providerId="LiveId" clId="{4FE8CBD7-78BF-4B93-AD3E-27E34B92CF03}" dt="2024-07-29T21:56:23.950" v="0" actId="20577"/>
           <ac:spMkLst>
             <pc:docMk/>
@@ -1617,6 +1625,21 @@
             <ac:picMk id="7" creationId="{8AD21E31-BAAC-48BF-5E38-922BAE70807D}"/>
           </ac:picMkLst>
         </pc:picChg>
+      </pc:sldChg>
+      <pc:sldChg chg="modSp mod">
+        <pc:chgData name="Christopher Turner" userId="108b2705a18cd39f" providerId="LiveId" clId="{4FE8CBD7-78BF-4B93-AD3E-27E34B92CF03}" dt="2024-07-29T22:08:59.279" v="111" actId="1076"/>
+        <pc:sldMkLst>
+          <pc:docMk/>
+          <pc:sldMk cId="3213317525" sldId="277"/>
+        </pc:sldMkLst>
+        <pc:spChg chg="mod">
+          <ac:chgData name="Christopher Turner" userId="108b2705a18cd39f" providerId="LiveId" clId="{4FE8CBD7-78BF-4B93-AD3E-27E34B92CF03}" dt="2024-07-29T22:08:59.279" v="111" actId="1076"/>
+          <ac:spMkLst>
+            <pc:docMk/>
+            <pc:sldMk cId="3213317525" sldId="277"/>
+            <ac:spMk id="6" creationId="{4104B51A-6C83-3663-1160-E079108B01E5}"/>
+          </ac:spMkLst>
+        </pc:spChg>
       </pc:sldChg>
     </pc:docChg>
   </pc:docChgLst>
@@ -7219,8 +7242,8 @@
         </p:nvSpPr>
         <p:spPr>
           <a:xfrm>
-            <a:off x="4516523" y="40003"/>
-            <a:ext cx="3158953" cy="521644"/>
+            <a:off x="3896497" y="-74142"/>
+            <a:ext cx="4629665" cy="521644"/>
           </a:xfrm>
           <a:prstGeom prst="rect">
             <a:avLst/>
@@ -7228,7 +7251,7 @@
         </p:spPr>
         <p:txBody>
           <a:bodyPr vert="horz" lIns="91440" tIns="45720" rIns="91440" bIns="45720" rtlCol="0" anchor="b">
-            <a:normAutofit/>
+            <a:normAutofit fontScale="77500" lnSpcReduction="20000"/>
           </a:bodyPr>
           <a:lstStyle>
             <a:lvl1pPr algn="l" defTabSz="457200" rtl="0" eaLnBrk="1" latinLnBrk="0" hangingPunct="1">
@@ -7309,7 +7332,7 @@
                   <a:schemeClr val="tx1"/>
                 </a:solidFill>
               </a:rPr>
-              <a:t>Genre vs rating</a:t>
+              <a:t>Genre vs rating and revenue</a:t>
             </a:r>
           </a:p>
         </p:txBody>
@@ -7716,8 +7739,8 @@
         </p:nvSpPr>
         <p:spPr>
           <a:xfrm>
-            <a:off x="3788258" y="-41190"/>
-            <a:ext cx="4658240" cy="521644"/>
+            <a:off x="3557598" y="-74141"/>
+            <a:ext cx="5372218" cy="521644"/>
           </a:xfrm>
           <a:prstGeom prst="rect">
             <a:avLst/>
@@ -7725,7 +7748,7 @@
         </p:spPr>
         <p:txBody>
           <a:bodyPr vert="horz" lIns="91440" tIns="45720" rIns="91440" bIns="45720" rtlCol="0" anchor="b">
-            <a:normAutofit/>
+            <a:normAutofit fontScale="85000" lnSpcReduction="10000"/>
           </a:bodyPr>
           <a:lstStyle>
             <a:lvl1pPr algn="l" defTabSz="457200" rtl="0" eaLnBrk="1" latinLnBrk="0" hangingPunct="1">
@@ -7806,7 +7829,7 @@
                   <a:schemeClr val="tx1"/>
                 </a:solidFill>
               </a:rPr>
-              <a:t>Genre vs rating cont’d</a:t>
+              <a:t>Genre vs Return on investment</a:t>
             </a:r>
           </a:p>
         </p:txBody>

</xml_diff>